<commit_message>
correction image radar plot
</commit_message>
<xml_diff>
--- a/P5/Presentation_projet_5.pptx
+++ b/P5/Presentation_projet_5.pptx
@@ -5150,23 +5150,7 @@
                   <a:srgbClr val="E8750C"/>
                 </a:solidFill>
               </a:rPr>
-              <a:t>Encodage des </a:t>
-            </a:r>
-            <a:r>
-              <a:rPr lang="fr-FR" dirty="0" smtClean="0">
-                <a:solidFill>
-                  <a:srgbClr val="E8750C"/>
-                </a:solidFill>
-              </a:rPr>
-              <a:t>articles </a:t>
-            </a:r>
-            <a:r>
-              <a:rPr lang="fr-FR" dirty="0" smtClean="0">
-                <a:solidFill>
-                  <a:srgbClr val="E8750C"/>
-                </a:solidFill>
-              </a:rPr>
-              <a:t>par cluster</a:t>
+              <a:t>Encodage des articles par cluster</a:t>
             </a:r>
           </a:p>
           <a:p>
@@ -5997,23 +5981,7 @@
                   <a:srgbClr val="E8750C"/>
                 </a:solidFill>
               </a:rPr>
-              <a:t>Garder </a:t>
-            </a:r>
-            <a:r>
-              <a:rPr lang="fr-FR" dirty="0" smtClean="0">
-                <a:solidFill>
-                  <a:srgbClr val="E8750C"/>
-                </a:solidFill>
-              </a:rPr>
-              <a:t>suffisamment </a:t>
-            </a:r>
-            <a:r>
-              <a:rPr lang="fr-FR" dirty="0" smtClean="0">
-                <a:solidFill>
-                  <a:srgbClr val="E8750C"/>
-                </a:solidFill>
-              </a:rPr>
-              <a:t>de </a:t>
+              <a:t>Garder suffisamment de </a:t>
             </a:r>
           </a:p>
           <a:p>
@@ -6994,9 +6962,77 @@
           <a:chExt cx="0" cy="0"/>
         </a:xfrm>
       </p:grpSpPr>
+      <p:sp>
+        <p:nvSpPr>
+          <p:cNvPr id="2" name="Titre 1"/>
+          <p:cNvSpPr>
+            <a:spLocks noGrp="1"/>
+          </p:cNvSpPr>
+          <p:nvPr>
+            <p:ph type="title"/>
+          </p:nvPr>
+        </p:nvSpPr>
+        <p:spPr/>
+        <p:txBody>
+          <a:bodyPr/>
+          <a:lstStyle/>
+          <a:p>
+            <a:r>
+              <a:rPr lang="fr-FR" dirty="0"/>
+              <a:t>Interprétation des Clusters</a:t>
+            </a:r>
+          </a:p>
+        </p:txBody>
+      </p:sp>
+      <p:sp>
+        <p:nvSpPr>
+          <p:cNvPr id="4" name="Espace réservé de la date 3"/>
+          <p:cNvSpPr>
+            <a:spLocks noGrp="1"/>
+          </p:cNvSpPr>
+          <p:nvPr>
+            <p:ph type="dt" sz="half" idx="10"/>
+          </p:nvPr>
+        </p:nvSpPr>
+        <p:spPr/>
+        <p:txBody>
+          <a:bodyPr/>
+          <a:lstStyle/>
+          <a:p>
+            <a:fld id="{30547005-2CCE-4AAF-810C-C33FB4661996}" type="datetime1">
+              <a:rPr lang="fr-FR" smtClean="0"/>
+              <a:t>18/12/2017</a:t>
+            </a:fld>
+            <a:endParaRPr lang="fr-FR"/>
+          </a:p>
+        </p:txBody>
+      </p:sp>
+      <p:sp>
+        <p:nvSpPr>
+          <p:cNvPr id="5" name="Espace réservé du pied de page 4"/>
+          <p:cNvSpPr>
+            <a:spLocks noGrp="1"/>
+          </p:cNvSpPr>
+          <p:nvPr>
+            <p:ph type="ftr" sz="quarter" idx="11"/>
+          </p:nvPr>
+        </p:nvSpPr>
+        <p:spPr/>
+        <p:txBody>
+          <a:bodyPr/>
+          <a:lstStyle/>
+          <a:p>
+            <a:r>
+              <a:rPr lang="fr-FR" dirty="0" smtClean="0"/>
+              <a:t>MINE Nicolas</a:t>
+            </a:r>
+            <a:endParaRPr lang="fr-FR" dirty="0"/>
+          </a:p>
+        </p:txBody>
+      </p:sp>
       <p:pic>
         <p:nvPicPr>
-          <p:cNvPr id="16390" name="Picture 6" descr="F:\Nicolas\Documents\OpenClassRoom\P5\img\polar_clusters.png"/>
+          <p:cNvPr id="1026" name="Picture 2" descr="F:\Nicolas\Documents\OpenClassRoom\P5\img\polar_clusters.png"/>
           <p:cNvPicPr>
             <a:picLocks noChangeAspect="1" noChangeArrowheads="1"/>
           </p:cNvPicPr>
@@ -7027,8 +7063,8 @@
         </p:blipFill>
         <p:spPr bwMode="auto">
           <a:xfrm>
-            <a:off x="1547664" y="1018902"/>
-            <a:ext cx="5839097" cy="5839098"/>
+            <a:off x="755576" y="980728"/>
+            <a:ext cx="7440724" cy="5952579"/>
           </a:xfrm>
           <a:prstGeom prst="rect">
             <a:avLst/>
@@ -7045,74 +7081,6 @@
           </a:extLst>
         </p:spPr>
       </p:pic>
-      <p:sp>
-        <p:nvSpPr>
-          <p:cNvPr id="2" name="Titre 1"/>
-          <p:cNvSpPr>
-            <a:spLocks noGrp="1"/>
-          </p:cNvSpPr>
-          <p:nvPr>
-            <p:ph type="title"/>
-          </p:nvPr>
-        </p:nvSpPr>
-        <p:spPr/>
-        <p:txBody>
-          <a:bodyPr/>
-          <a:lstStyle/>
-          <a:p>
-            <a:r>
-              <a:rPr lang="fr-FR" dirty="0"/>
-              <a:t>Interprétation des Clusters</a:t>
-            </a:r>
-          </a:p>
-        </p:txBody>
-      </p:sp>
-      <p:sp>
-        <p:nvSpPr>
-          <p:cNvPr id="4" name="Espace réservé de la date 3"/>
-          <p:cNvSpPr>
-            <a:spLocks noGrp="1"/>
-          </p:cNvSpPr>
-          <p:nvPr>
-            <p:ph type="dt" sz="half" idx="10"/>
-          </p:nvPr>
-        </p:nvSpPr>
-        <p:spPr/>
-        <p:txBody>
-          <a:bodyPr/>
-          <a:lstStyle/>
-          <a:p>
-            <a:fld id="{30547005-2CCE-4AAF-810C-C33FB4661996}" type="datetime1">
-              <a:rPr lang="fr-FR" smtClean="0"/>
-              <a:t>18/12/2017</a:t>
-            </a:fld>
-            <a:endParaRPr lang="fr-FR"/>
-          </a:p>
-        </p:txBody>
-      </p:sp>
-      <p:sp>
-        <p:nvSpPr>
-          <p:cNvPr id="5" name="Espace réservé du pied de page 4"/>
-          <p:cNvSpPr>
-            <a:spLocks noGrp="1"/>
-          </p:cNvSpPr>
-          <p:nvPr>
-            <p:ph type="ftr" sz="quarter" idx="11"/>
-          </p:nvPr>
-        </p:nvSpPr>
-        <p:spPr/>
-        <p:txBody>
-          <a:bodyPr/>
-          <a:lstStyle/>
-          <a:p>
-            <a:r>
-              <a:rPr lang="fr-FR" dirty="0" smtClean="0"/>
-              <a:t>MINE Nicolas</a:t>
-            </a:r>
-            <a:endParaRPr lang="fr-FR" dirty="0"/>
-          </a:p>
-        </p:txBody>
-      </p:sp>
     </p:spTree>
     <p:extLst>
       <p:ext uri="{BB962C8B-B14F-4D97-AF65-F5344CB8AC3E}">
@@ -7201,15 +7169,7 @@
                   <a:srgbClr val="E8750C"/>
                 </a:solidFill>
               </a:rPr>
-              <a:t>Suppression </a:t>
-            </a:r>
-            <a:r>
-              <a:rPr lang="fr-FR" dirty="0" smtClean="0">
-                <a:solidFill>
-                  <a:srgbClr val="E8750C"/>
-                </a:solidFill>
-              </a:rPr>
-              <a:t>Cluster 6 (4 clients – VIP)</a:t>
+              <a:t>Suppression Cluster 6 (4 clients – VIP)</a:t>
             </a:r>
           </a:p>
           <a:p>
@@ -7277,15 +7237,7 @@
                   <a:srgbClr val="E8750C"/>
                 </a:solidFill>
               </a:rPr>
-              <a:t>KNN </a:t>
-            </a:r>
-            <a:r>
-              <a:rPr lang="fr-FR" dirty="0" smtClean="0">
-                <a:solidFill>
-                  <a:srgbClr val="E8750C"/>
-                </a:solidFill>
-              </a:rPr>
-              <a:t>( </a:t>
+              <a:t>KNN ( </a:t>
             </a:r>
             <a:r>
               <a:rPr lang="fr-FR" dirty="0" err="1" smtClean="0">
@@ -8317,11 +8269,6 @@
               </a:rPr>
               <a:t> =&gt; prédiction</a:t>
             </a:r>
-            <a:endParaRPr lang="fr-FR" sz="2000" dirty="0" smtClean="0">
-              <a:solidFill>
-                <a:srgbClr val="E8750C"/>
-              </a:solidFill>
-            </a:endParaRPr>
           </a:p>
           <a:p>
             <a:pPr lvl="1"/>
@@ -9042,24 +8989,16 @@
                   <a:srgbClr val="E8750C"/>
                 </a:solidFill>
               </a:rPr>
-              <a:t>Risque d’erreur assez faible même avec peu </a:t>
-            </a:r>
+              <a:t>Risque d’erreur assez faible même avec peu d’achats</a:t>
+            </a:r>
+          </a:p>
+          <a:p>
             <a:r>
               <a:rPr lang="fr-FR" sz="2400" dirty="0" smtClean="0">
                 <a:solidFill>
                   <a:srgbClr val="E8750C"/>
                 </a:solidFill>
               </a:rPr>
-              <a:t>d’achats</a:t>
-            </a:r>
-          </a:p>
-          <a:p>
-            <a:r>
-              <a:rPr lang="fr-FR" sz="2400" dirty="0" smtClean="0">
-                <a:solidFill>
-                  <a:srgbClr val="E8750C"/>
-                </a:solidFill>
-              </a:rPr>
               <a:t>Evolution des clients de certains cluster dans le temps ?</a:t>
             </a:r>
           </a:p>
@@ -9081,11 +9020,6 @@
               </a:rPr>
               <a:t> ou perte du client</a:t>
             </a:r>
-            <a:endParaRPr lang="fr-FR" sz="2000" dirty="0" smtClean="0">
-              <a:solidFill>
-                <a:srgbClr val="E8750C"/>
-              </a:solidFill>
-            </a:endParaRPr>
           </a:p>
         </p:txBody>
       </p:sp>

</xml_diff>